<commit_message>
added video link & updated pptx
</commit_message>
<xml_diff>
--- a/docs/runai_mlflow_ui.pptx
+++ b/docs/runai_mlflow_ui.pptx
@@ -13,26 +13,26 @@
   <p:sldIdLst>
     <p:sldId id="319" r:id="rId3"/>
     <p:sldId id="527" r:id="rId4"/>
-    <p:sldId id="961" r:id="rId5"/>
-    <p:sldId id="1175" r:id="rId6"/>
-    <p:sldId id="1177" r:id="rId7"/>
+    <p:sldId id="1233" r:id="rId5"/>
+    <p:sldId id="1235" r:id="rId6"/>
+    <p:sldId id="1238" r:id="rId7"/>
     <p:sldId id="1178" r:id="rId8"/>
-    <p:sldId id="1180" r:id="rId9"/>
+    <p:sldId id="1240" r:id="rId9"/>
     <p:sldId id="1217" r:id="rId10"/>
-    <p:sldId id="1213" r:id="rId11"/>
+    <p:sldId id="1242" r:id="rId11"/>
     <p:sldId id="1214" r:id="rId12"/>
-    <p:sldId id="1215" r:id="rId13"/>
+    <p:sldId id="1245" r:id="rId13"/>
     <p:sldId id="1218" r:id="rId14"/>
-    <p:sldId id="1176" r:id="rId15"/>
-    <p:sldId id="1219" r:id="rId16"/>
+    <p:sldId id="1250" r:id="rId15"/>
+    <p:sldId id="1256" r:id="rId16"/>
     <p:sldId id="1220" r:id="rId17"/>
-    <p:sldId id="1221" r:id="rId18"/>
-    <p:sldId id="1223" r:id="rId19"/>
+    <p:sldId id="1257" r:id="rId18"/>
+    <p:sldId id="1260" r:id="rId19"/>
     <p:sldId id="1224" r:id="rId20"/>
     <p:sldId id="1225" r:id="rId21"/>
-    <p:sldId id="1226" r:id="rId22"/>
-    <p:sldId id="1227" r:id="rId23"/>
-    <p:sldId id="1228" r:id="rId24"/>
+    <p:sldId id="1262" r:id="rId22"/>
+    <p:sldId id="1268" r:id="rId23"/>
+    <p:sldId id="1270" r:id="rId24"/>
     <p:sldId id="539" r:id="rId25"/>
   </p:sldIdLst>
   <p:sldSz cx="9144000" cy="5143500" type="screen16x9"/>
@@ -14036,18 +14036,18 @@
             <a:r>
               <a:rPr lang="en-US" sz="3600" b="0" i="0" u="none" strike="noStrike" cap="none" dirty="0" err="1">
                 <a:solidFill>
-                  <a:schemeClr val="lt1"/>
+                  <a:schemeClr val="accent1"/>
                 </a:solidFill>
                 <a:latin typeface="+mj-lt"/>
                 <a:ea typeface="Montserrat Medium"/>
                 <a:cs typeface="+mj-lt"/>
                 <a:sym typeface="Montserrat Medium"/>
               </a:rPr>
-              <a:t>Run:ai</a:t>
+              <a:t>run:ai</a:t>
             </a:r>
             <a:endParaRPr lang="en-US" sz="3600" b="0" i="0" u="none" strike="noStrike" cap="none" dirty="0" err="1">
               <a:solidFill>
-                <a:schemeClr val="lt1"/>
+                <a:schemeClr val="accent1"/>
               </a:solidFill>
               <a:latin typeface="+mj-lt"/>
               <a:ea typeface="Montserrat Medium"/>
@@ -15295,7 +15295,7 @@
               </a:spcAft>
             </a:pPr>
             <a:r>
-              <a:rPr lang="en-US" sz="1200" dirty="0">
+              <a:rPr lang="en-US" sz="1200" b="1" dirty="0">
                 <a:solidFill>
                   <a:schemeClr val="accent6"/>
                 </a:solidFill>
@@ -15306,7 +15306,7 @@
               </a:rPr>
               <a:t>jonathancosme/mlflow-ui</a:t>
             </a:r>
-            <a:endParaRPr lang="en-US" sz="1200" dirty="0">
+            <a:endParaRPr lang="en-US" sz="1200" b="1" dirty="0">
               <a:solidFill>
                 <a:schemeClr val="accent6"/>
               </a:solidFill>
@@ -16158,7 +16158,7 @@
               </a:spcAft>
             </a:pPr>
             <a:r>
-              <a:rPr lang="en-US" sz="1200" dirty="0">
+              <a:rPr lang="en-US" sz="1200" b="1" dirty="0">
                 <a:solidFill>
                   <a:schemeClr val="accent6"/>
                 </a:solidFill>
@@ -16169,66 +16169,7 @@
               </a:rPr>
               <a:t>jonathancosme/mlflow-ui</a:t>
             </a:r>
-            <a:endParaRPr lang="en-US" sz="1200" dirty="0">
-              <a:solidFill>
-                <a:schemeClr val="accent6"/>
-              </a:solidFill>
-              <a:latin typeface="+mj-lt"/>
-              <a:ea typeface="Clean" charset="0"/>
-              <a:cs typeface="+mj-lt"/>
-              <a:sym typeface="Clean" charset="0"/>
-            </a:endParaRPr>
-          </a:p>
-        </p:txBody>
-      </p:sp>
-      <p:sp>
-        <p:nvSpPr>
-          <p:cNvPr id="2" name="Google Shape;898;p88"/>
-          <p:cNvSpPr txBox="1"/>
-          <p:nvPr/>
-        </p:nvSpPr>
-        <p:spPr>
-          <a:xfrm>
-            <a:off x="572770" y="1553845"/>
-            <a:ext cx="5994400" cy="441960"/>
-          </a:xfrm>
-          <a:prstGeom prst="rect">
-            <a:avLst/>
-          </a:prstGeom>
-          <a:noFill/>
-          <a:ln>
-            <a:noFill/>
-          </a:ln>
-        </p:spPr>
-        <p:txBody>
-          <a:bodyPr spcFirstLastPara="1" wrap="square" lIns="9144" tIns="9144" rIns="9144" bIns="9144" anchor="t" anchorCtr="0">
-            <a:spAutoFit/>
-          </a:bodyPr>
-          <a:p>
-            <a:pPr marR="0" lvl="0" algn="l" rtl="0">
-              <a:lnSpc>
-                <a:spcPct val="115000"/>
-              </a:lnSpc>
-              <a:spcBef>
-                <a:spcPts val="0"/>
-              </a:spcBef>
-              <a:spcAft>
-                <a:spcPts val="0"/>
-              </a:spcAft>
-            </a:pPr>
-            <a:r>
-              <a:rPr lang="en-US" sz="1200" dirty="0">
-                <a:solidFill>
-                  <a:schemeClr val="accent6"/>
-                </a:solidFill>
-                <a:latin typeface="+mj-lt"/>
-                <a:ea typeface="Clean" charset="0"/>
-                <a:cs typeface="+mj-lt"/>
-                <a:sym typeface="Clean" charset="0"/>
-              </a:rPr>
-              <a:t>in order to access the mlflow UI, we need to add this entry to the jupyter_server_config.py file, and replace the existing file in the image</a:t>
-            </a:r>
-            <a:endParaRPr lang="en-US" sz="1200" dirty="0">
+            <a:endParaRPr lang="en-US" sz="1200" b="1" dirty="0">
               <a:solidFill>
                 <a:schemeClr val="accent6"/>
               </a:solidFill>
@@ -16695,6 +16636,113 @@
           </a:fontRef>
         </p:style>
       </p:cxnSp>
+      <p:sp>
+        <p:nvSpPr>
+          <p:cNvPr id="8" name="Google Shape;898;p88"/>
+          <p:cNvSpPr txBox="1"/>
+          <p:nvPr/>
+        </p:nvSpPr>
+        <p:spPr>
+          <a:xfrm>
+            <a:off x="572770" y="1553845"/>
+            <a:ext cx="5994400" cy="441960"/>
+          </a:xfrm>
+          <a:prstGeom prst="rect">
+            <a:avLst/>
+          </a:prstGeom>
+          <a:noFill/>
+          <a:ln>
+            <a:noFill/>
+          </a:ln>
+        </p:spPr>
+        <p:txBody>
+          <a:bodyPr spcFirstLastPara="1" wrap="square" lIns="9144" tIns="9144" rIns="9144" bIns="9144" anchor="t" anchorCtr="0">
+            <a:spAutoFit/>
+          </a:bodyPr>
+          <a:p>
+            <a:pPr marR="0" lvl="0" algn="l" rtl="0">
+              <a:lnSpc>
+                <a:spcPct val="115000"/>
+              </a:lnSpc>
+              <a:spcBef>
+                <a:spcPts val="0"/>
+              </a:spcBef>
+              <a:spcAft>
+                <a:spcPts val="0"/>
+              </a:spcAft>
+            </a:pPr>
+            <a:r>
+              <a:rPr lang="en-US" sz="1200" dirty="0">
+                <a:solidFill>
+                  <a:schemeClr val="accent6"/>
+                </a:solidFill>
+                <a:latin typeface="+mj-lt"/>
+                <a:ea typeface="Clean" charset="0"/>
+                <a:cs typeface="+mj-lt"/>
+                <a:sym typeface="Clean" charset="0"/>
+              </a:rPr>
+              <a:t>in order </a:t>
+            </a:r>
+            <a:r>
+              <a:rPr lang="en-US" sz="1200" u="sng" dirty="0">
+                <a:solidFill>
+                  <a:schemeClr val="accent6"/>
+                </a:solidFill>
+                <a:latin typeface="+mj-lt"/>
+                <a:ea typeface="Clean" charset="0"/>
+                <a:cs typeface="+mj-lt"/>
+                <a:sym typeface="Clean" charset="0"/>
+              </a:rPr>
+              <a:t>to access the mlflow UI</a:t>
+            </a:r>
+            <a:r>
+              <a:rPr lang="en-US" sz="1200" dirty="0">
+                <a:solidFill>
+                  <a:schemeClr val="accent6"/>
+                </a:solidFill>
+                <a:latin typeface="+mj-lt"/>
+                <a:ea typeface="Clean" charset="0"/>
+                <a:cs typeface="+mj-lt"/>
+                <a:sym typeface="Clean" charset="0"/>
+              </a:rPr>
+              <a:t>, we need to </a:t>
+            </a:r>
+            <a:r>
+              <a:rPr lang="en-US" sz="1200" b="1" dirty="0">
+                <a:solidFill>
+                  <a:schemeClr val="accent6"/>
+                </a:solidFill>
+                <a:latin typeface="+mj-lt"/>
+                <a:ea typeface="Clean" charset="0"/>
+                <a:cs typeface="+mj-lt"/>
+                <a:sym typeface="Clean" charset="0"/>
+              </a:rPr>
+              <a:t>add this entry to the jupyter_server_config.py</a:t>
+            </a:r>
+            <a:r>
+              <a:rPr lang="en-US" sz="1200" dirty="0">
+                <a:solidFill>
+                  <a:schemeClr val="accent6"/>
+                </a:solidFill>
+                <a:latin typeface="+mj-lt"/>
+                <a:ea typeface="Clean" charset="0"/>
+                <a:cs typeface="+mj-lt"/>
+                <a:sym typeface="Clean" charset="0"/>
+              </a:rPr>
+              <a:t> file, and replace the existing file in the image</a:t>
+            </a:r>
+            <a:endParaRPr lang="en-US" sz="1200" dirty="0">
+              <a:solidFill>
+                <a:schemeClr val="accent6"/>
+              </a:solidFill>
+              <a:latin typeface="+mj-lt"/>
+              <a:ea typeface="Clean" charset="0"/>
+              <a:cs typeface="+mj-lt"/>
+              <a:sym typeface="Clean" charset="0"/>
+            </a:endParaRPr>
+          </a:p>
+        </p:txBody>
+      </p:sp>
     </p:spTree>
   </p:cSld>
   <p:clrMapOvr>
@@ -20697,7 +20745,31 @@
                 <a:cs typeface="+mj-lt"/>
                 <a:sym typeface="Clean" charset="0"/>
               </a:rPr>
-              <a:t>1) A Database to store information related to experiment runs</a:t>
+              <a:t>1) A </a:t>
+            </a:r>
+            <a:r>
+              <a:rPr lang="en-US" sz="1200" b="1" dirty="0">
+                <a:solidFill>
+                  <a:schemeClr val="accent6"/>
+                </a:solidFill>
+                <a:latin typeface="+mj-lt"/>
+                <a:ea typeface="Clean" charset="0"/>
+                <a:cs typeface="+mj-lt"/>
+                <a:sym typeface="Clean" charset="0"/>
+              </a:rPr>
+              <a:t>Database </a:t>
+            </a:r>
+            <a:r>
+              <a:rPr lang="en-US" sz="1200" dirty="0">
+                <a:solidFill>
+                  <a:schemeClr val="accent6"/>
+                </a:solidFill>
+                <a:latin typeface="+mj-lt"/>
+                <a:ea typeface="Clean" charset="0"/>
+                <a:cs typeface="+mj-lt"/>
+                <a:sym typeface="Clean" charset="0"/>
+              </a:rPr>
+              <a:t>to store information related to experiment runs</a:t>
             </a:r>
             <a:endParaRPr lang="en-US" sz="1200" dirty="0">
               <a:solidFill>
@@ -20731,7 +20803,31 @@
                 <a:cs typeface="+mj-lt"/>
                 <a:sym typeface="Clean" charset="0"/>
               </a:rPr>
-              <a:t>2) An Artifacts folder to store objects related to the runs</a:t>
+              <a:t>2) An </a:t>
+            </a:r>
+            <a:r>
+              <a:rPr lang="en-US" sz="1200" b="1" dirty="0">
+                <a:solidFill>
+                  <a:schemeClr val="accent6"/>
+                </a:solidFill>
+                <a:latin typeface="+mj-lt"/>
+                <a:ea typeface="Clean" charset="0"/>
+                <a:cs typeface="+mj-lt"/>
+                <a:sym typeface="Clean" charset="0"/>
+              </a:rPr>
+              <a:t>Artifacts folder</a:t>
+            </a:r>
+            <a:r>
+              <a:rPr lang="en-US" sz="1200" dirty="0">
+                <a:solidFill>
+                  <a:schemeClr val="accent6"/>
+                </a:solidFill>
+                <a:latin typeface="+mj-lt"/>
+                <a:ea typeface="Clean" charset="0"/>
+                <a:cs typeface="+mj-lt"/>
+                <a:sym typeface="Clean" charset="0"/>
+              </a:rPr>
+              <a:t> to store objects related to the runs</a:t>
             </a:r>
             <a:endParaRPr lang="en-US" sz="1200" dirty="0">
               <a:solidFill>
@@ -21092,7 +21188,7 @@
                 <a:cs typeface="+mj-lt"/>
                 <a:sym typeface="Clean" charset="0"/>
               </a:rPr>
-              <a:t>running either of these commands will automatically create a databse in the local directory, if one doesn’t exist.</a:t>
+              <a:t>running either of these commands will automatically create a database in the local directory, if one doesn’t exist.</a:t>
             </a:r>
             <a:endParaRPr lang="en-US" sz="1200" dirty="0">
               <a:solidFill>
@@ -22095,7 +22191,7 @@
         <p:spPr>
           <a:xfrm>
             <a:off x="4162425" y="1182370"/>
-            <a:ext cx="3208655" cy="1290955"/>
+            <a:ext cx="3208655" cy="1503045"/>
           </a:xfrm>
           <a:prstGeom prst="rect">
             <a:avLst/>
@@ -22110,7 +22206,7 @@
             <a:spAutoFit/>
           </a:bodyPr>
           <a:p>
-            <a:pPr marR="0" lvl="0" algn="just" rtl="0">
+            <a:pPr marR="0" lvl="0" algn="l" rtl="0">
               <a:lnSpc>
                 <a:spcPct val="115000"/>
               </a:lnSpc>
@@ -22131,7 +22227,31 @@
                 <a:cs typeface="+mj-lt"/>
                 <a:sym typeface="Clean" charset="0"/>
               </a:rPr>
-              <a:t>2) A docker image with the following installed</a:t>
+              <a:t>2) A </a:t>
+            </a:r>
+            <a:r>
+              <a:rPr lang="en-US" sz="1200" b="1" dirty="0">
+                <a:solidFill>
+                  <a:schemeClr val="accent6"/>
+                </a:solidFill>
+                <a:latin typeface="+mj-lt"/>
+                <a:ea typeface="Clean" charset="0"/>
+                <a:cs typeface="+mj-lt"/>
+                <a:sym typeface="Clean" charset="0"/>
+              </a:rPr>
+              <a:t>docker image</a:t>
+            </a:r>
+            <a:r>
+              <a:rPr lang="en-US" sz="1200" dirty="0">
+                <a:solidFill>
+                  <a:schemeClr val="accent6"/>
+                </a:solidFill>
+                <a:latin typeface="+mj-lt"/>
+                <a:ea typeface="Clean" charset="0"/>
+                <a:cs typeface="+mj-lt"/>
+                <a:sym typeface="Clean" charset="0"/>
+              </a:rPr>
+              <a:t> with the following installed</a:t>
             </a:r>
             <a:endParaRPr lang="en-US" sz="1200" dirty="0">
               <a:solidFill>
@@ -22144,7 +22264,7 @@
             </a:endParaRPr>
           </a:p>
           <a:p>
-            <a:pPr marL="171450" marR="0" lvl="0" indent="-171450" algn="just" rtl="0">
+            <a:pPr marL="171450" marR="0" lvl="0" indent="-171450" algn="l" rtl="0">
               <a:lnSpc>
                 <a:spcPct val="115000"/>
               </a:lnSpc>
@@ -22180,7 +22300,7 @@
             </a:endParaRPr>
           </a:p>
           <a:p>
-            <a:pPr marL="171450" marR="0" lvl="0" indent="-171450" algn="just" rtl="0">
+            <a:pPr marL="171450" marR="0" lvl="0" indent="-171450" algn="l" rtl="0">
               <a:lnSpc>
                 <a:spcPct val="115000"/>
               </a:lnSpc>
@@ -22216,7 +22336,7 @@
             </a:endParaRPr>
           </a:p>
           <a:p>
-            <a:pPr marL="171450" marR="0" lvl="0" indent="-171450" algn="just" rtl="0">
+            <a:pPr marL="171450" marR="0" lvl="0" indent="-171450" algn="l" rtl="0">
               <a:lnSpc>
                 <a:spcPct val="115000"/>
               </a:lnSpc>
@@ -22252,7 +22372,7 @@
             </a:endParaRPr>
           </a:p>
           <a:p>
-            <a:pPr marL="171450" marR="0" lvl="0" indent="-171450" algn="just" rtl="0">
+            <a:pPr marL="171450" marR="0" lvl="0" indent="-171450" algn="l" rtl="0">
               <a:lnSpc>
                 <a:spcPct val="115000"/>
               </a:lnSpc>
@@ -22276,7 +22396,7 @@
             </a:endParaRPr>
           </a:p>
           <a:p>
-            <a:pPr marL="0" marR="0" lvl="0" indent="0" algn="just" rtl="0">
+            <a:pPr marL="0" marR="0" lvl="0" indent="0" algn="l" rtl="0">
               <a:lnSpc>
                 <a:spcPct val="115000"/>
               </a:lnSpc>
@@ -22337,7 +22457,7 @@
             <a:spAutoFit/>
           </a:bodyPr>
           <a:p>
-            <a:pPr marR="0" lvl="0" algn="just" rtl="0">
+            <a:pPr marR="0" lvl="0" algn="l" rtl="0">
               <a:lnSpc>
                 <a:spcPct val="115000"/>
               </a:lnSpc>
@@ -22358,7 +22478,31 @@
                 <a:cs typeface="+mj-lt"/>
                 <a:sym typeface="Clean" charset="0"/>
               </a:rPr>
-              <a:t>1) A persistent directory to keep</a:t>
+              <a:t>1) A </a:t>
+            </a:r>
+            <a:r>
+              <a:rPr lang="en-US" sz="1200" b="1" dirty="0">
+                <a:solidFill>
+                  <a:schemeClr val="accent6"/>
+                </a:solidFill>
+                <a:latin typeface="+mj-lt"/>
+                <a:ea typeface="Clean" charset="0"/>
+                <a:cs typeface="+mj-lt"/>
+                <a:sym typeface="Clean" charset="0"/>
+              </a:rPr>
+              <a:t>persistent </a:t>
+            </a:r>
+            <a:r>
+              <a:rPr lang="en-US" sz="1200" dirty="0">
+                <a:solidFill>
+                  <a:schemeClr val="accent6"/>
+                </a:solidFill>
+                <a:latin typeface="+mj-lt"/>
+                <a:ea typeface="Clean" charset="0"/>
+                <a:cs typeface="+mj-lt"/>
+                <a:sym typeface="Clean" charset="0"/>
+              </a:rPr>
+              <a:t>directory to keep</a:t>
             </a:r>
             <a:endParaRPr lang="en-US" sz="1200" dirty="0">
               <a:solidFill>
@@ -22371,7 +22515,7 @@
             </a:endParaRPr>
           </a:p>
           <a:p>
-            <a:pPr marL="171450" marR="0" lvl="0" indent="-171450" algn="just" rtl="0">
+            <a:pPr marL="171450" marR="0" lvl="0" indent="-171450" algn="l" rtl="0">
               <a:lnSpc>
                 <a:spcPct val="115000"/>
               </a:lnSpc>
@@ -22407,7 +22551,7 @@
             </a:endParaRPr>
           </a:p>
           <a:p>
-            <a:pPr marL="171450" marR="0" lvl="0" indent="-171450" algn="just" rtl="0">
+            <a:pPr marL="171450" marR="0" lvl="0" indent="-171450" algn="l" rtl="0">
               <a:lnSpc>
                 <a:spcPct val="115000"/>
               </a:lnSpc>

</xml_diff>